<commit_message>
added results to presentation
</commit_message>
<xml_diff>
--- a/presentation/Presentation.pptx
+++ b/presentation/Presentation.pptx
@@ -4248,8 +4248,8 @@
         </p:blipFill>
         <p:spPr>
           <a:xfrm>
-            <a:off x="838200" y="1926831"/>
-            <a:ext cx="2284668" cy="2346231"/>
+            <a:off x="838199" y="1926831"/>
+            <a:ext cx="3006969" cy="3087995"/>
           </a:xfrm>
           <a:prstGeom prst="rect">
             <a:avLst/>
@@ -4281,6 +4281,124 @@
             <a:r>
               <a:rPr lang="en-US" sz="1200" dirty="0"/>
               <a:t>Bunny: 7.16s</a:t>
+            </a:r>
+          </a:p>
+        </p:txBody>
+      </p:sp>
+      <p:pic>
+        <p:nvPicPr>
+          <p:cNvPr id="4" name="Picture 3"/>
+          <p:cNvPicPr>
+            <a:picLocks noChangeAspect="1"/>
+          </p:cNvPicPr>
+          <p:nvPr/>
+        </p:nvPicPr>
+        <p:blipFill>
+          <a:blip r:embed="rId3" cstate="print">
+            <a:extLst>
+              <a:ext uri="{28A0092B-C50C-407E-A947-70E740481C1C}">
+                <a14:useLocalDpi xmlns:a14="http://schemas.microsoft.com/office/drawing/2010/main" val="0"/>
+              </a:ext>
+            </a:extLst>
+          </a:blip>
+          <a:stretch>
+            <a:fillRect/>
+          </a:stretch>
+        </p:blipFill>
+        <p:spPr>
+          <a:xfrm>
+            <a:off x="4488666" y="1926831"/>
+            <a:ext cx="3006969" cy="3087995"/>
+          </a:xfrm>
+          <a:prstGeom prst="rect">
+            <a:avLst/>
+          </a:prstGeom>
+        </p:spPr>
+      </p:pic>
+      <p:pic>
+        <p:nvPicPr>
+          <p:cNvPr id="8" name="Picture 7"/>
+          <p:cNvPicPr>
+            <a:picLocks noChangeAspect="1"/>
+          </p:cNvPicPr>
+          <p:nvPr/>
+        </p:nvPicPr>
+        <p:blipFill>
+          <a:blip r:embed="rId4" cstate="print">
+            <a:extLst>
+              <a:ext uri="{28A0092B-C50C-407E-A947-70E740481C1C}">
+                <a14:useLocalDpi xmlns:a14="http://schemas.microsoft.com/office/drawing/2010/main" val="0"/>
+              </a:ext>
+            </a:extLst>
+          </a:blip>
+          <a:stretch>
+            <a:fillRect/>
+          </a:stretch>
+        </p:blipFill>
+        <p:spPr>
+          <a:xfrm>
+            <a:off x="8134652" y="1926831"/>
+            <a:ext cx="3011451" cy="3092599"/>
+          </a:xfrm>
+          <a:prstGeom prst="rect">
+            <a:avLst/>
+          </a:prstGeom>
+        </p:spPr>
+      </p:pic>
+      <p:sp>
+        <p:nvSpPr>
+          <p:cNvPr id="9" name="TextBox 8"/>
+          <p:cNvSpPr txBox="1"/>
+          <p:nvPr/>
+        </p:nvSpPr>
+        <p:spPr>
+          <a:xfrm>
+            <a:off x="4484185" y="1649832"/>
+            <a:ext cx="2089931" cy="276999"/>
+          </a:xfrm>
+          <a:prstGeom prst="rect">
+            <a:avLst/>
+          </a:prstGeom>
+          <a:noFill/>
+        </p:spPr>
+        <p:txBody>
+          <a:bodyPr wrap="none" rtlCol="0">
+            <a:spAutoFit/>
+          </a:bodyPr>
+          <a:lstStyle/>
+          <a:p>
+            <a:r>
+              <a:rPr lang="en-US" sz="1200" dirty="0"/>
+              <a:t>Cube: 4.51s (did not converge)</a:t>
+            </a:r>
+          </a:p>
+        </p:txBody>
+      </p:sp>
+      <p:sp>
+        <p:nvSpPr>
+          <p:cNvPr id="10" name="TextBox 9"/>
+          <p:cNvSpPr txBox="1"/>
+          <p:nvPr/>
+        </p:nvSpPr>
+        <p:spPr>
+          <a:xfrm>
+            <a:off x="8134652" y="1684548"/>
+            <a:ext cx="2342244" cy="276999"/>
+          </a:xfrm>
+          <a:prstGeom prst="rect">
+            <a:avLst/>
+          </a:prstGeom>
+          <a:noFill/>
+        </p:spPr>
+        <p:txBody>
+          <a:bodyPr wrap="none" rtlCol="0">
+            <a:spAutoFit/>
+          </a:bodyPr>
+          <a:lstStyle/>
+          <a:p>
+            <a:r>
+              <a:rPr lang="en-US" sz="1200" dirty="0"/>
+              <a:t>Dragon: 1m 24s (did not converge)</a:t>
             </a:r>
           </a:p>
         </p:txBody>

</xml_diff>